<commit_message>
custom deserialization not done
</commit_message>
<xml_diff>
--- a/json_binding(jackson)/presentation.pptx
+++ b/json_binding(jackson)/presentation.pptx
@@ -8,6 +8,9 @@
     <p:sldId id="256" r:id="rId2"/>
     <p:sldId id="257" r:id="rId3"/>
     <p:sldId id="258" r:id="rId4"/>
+    <p:sldId id="259" r:id="rId5"/>
+    <p:sldId id="260" r:id="rId6"/>
+    <p:sldId id="261" r:id="rId7"/>
   </p:sldIdLst>
   <p:sldSz cx="12192000" cy="6858000"/>
   <p:notesSz cx="6858000" cy="9144000"/>
@@ -106,6 +109,11 @@
       </a:defRPr>
     </a:lvl9pPr>
   </p:defaultTextStyle>
+  <p:extLst>
+    <p:ext uri="{EFAFB233-063F-42B5-8137-9DF3F51BA10A}">
+      <p15:sldGuideLst xmlns:p15="http://schemas.microsoft.com/office/powerpoint/2012/main"/>
+    </p:ext>
+  </p:extLst>
 </p:presentation>
 </file>
 
@@ -240,7 +248,7 @@
           <a:p>
             <a:fld id="{0536FF60-20DE-42A1-AD3F-836407FBD114}" type="datetimeFigureOut">
               <a:rPr lang="en-US" smtClean="0"/>
-              <a:t>4/4/2018</a:t>
+              <a:t>4/5/2018</a:t>
             </a:fld>
             <a:endParaRPr lang="en-US" dirty="0"/>
           </a:p>
@@ -410,7 +418,7 @@
           <a:p>
             <a:fld id="{0536FF60-20DE-42A1-AD3F-836407FBD114}" type="datetimeFigureOut">
               <a:rPr lang="en-US" smtClean="0"/>
-              <a:t>4/4/2018</a:t>
+              <a:t>4/5/2018</a:t>
             </a:fld>
             <a:endParaRPr lang="en-US" dirty="0"/>
           </a:p>
@@ -590,7 +598,7 @@
           <a:p>
             <a:fld id="{0536FF60-20DE-42A1-AD3F-836407FBD114}" type="datetimeFigureOut">
               <a:rPr lang="en-US" smtClean="0"/>
-              <a:t>4/4/2018</a:t>
+              <a:t>4/5/2018</a:t>
             </a:fld>
             <a:endParaRPr lang="en-US" dirty="0"/>
           </a:p>
@@ -760,7 +768,7 @@
           <a:p>
             <a:fld id="{0536FF60-20DE-42A1-AD3F-836407FBD114}" type="datetimeFigureOut">
               <a:rPr lang="en-US" smtClean="0"/>
-              <a:t>4/4/2018</a:t>
+              <a:t>4/5/2018</a:t>
             </a:fld>
             <a:endParaRPr lang="en-US" dirty="0"/>
           </a:p>
@@ -1006,7 +1014,7 @@
           <a:p>
             <a:fld id="{0536FF60-20DE-42A1-AD3F-836407FBD114}" type="datetimeFigureOut">
               <a:rPr lang="en-US" smtClean="0"/>
-              <a:t>4/4/2018</a:t>
+              <a:t>4/5/2018</a:t>
             </a:fld>
             <a:endParaRPr lang="en-US" dirty="0"/>
           </a:p>
@@ -1238,7 +1246,7 @@
           <a:p>
             <a:fld id="{0536FF60-20DE-42A1-AD3F-836407FBD114}" type="datetimeFigureOut">
               <a:rPr lang="en-US" smtClean="0"/>
-              <a:t>4/4/2018</a:t>
+              <a:t>4/5/2018</a:t>
             </a:fld>
             <a:endParaRPr lang="en-US" dirty="0"/>
           </a:p>
@@ -1605,7 +1613,7 @@
           <a:p>
             <a:fld id="{0536FF60-20DE-42A1-AD3F-836407FBD114}" type="datetimeFigureOut">
               <a:rPr lang="en-US" smtClean="0"/>
-              <a:t>4/4/2018</a:t>
+              <a:t>4/5/2018</a:t>
             </a:fld>
             <a:endParaRPr lang="en-US" dirty="0"/>
           </a:p>
@@ -1723,7 +1731,7 @@
           <a:p>
             <a:fld id="{0536FF60-20DE-42A1-AD3F-836407FBD114}" type="datetimeFigureOut">
               <a:rPr lang="en-US" smtClean="0"/>
-              <a:t>4/4/2018</a:t>
+              <a:t>4/5/2018</a:t>
             </a:fld>
             <a:endParaRPr lang="en-US" dirty="0"/>
           </a:p>
@@ -1818,7 +1826,7 @@
           <a:p>
             <a:fld id="{0536FF60-20DE-42A1-AD3F-836407FBD114}" type="datetimeFigureOut">
               <a:rPr lang="en-US" smtClean="0"/>
-              <a:t>4/4/2018</a:t>
+              <a:t>4/5/2018</a:t>
             </a:fld>
             <a:endParaRPr lang="en-US" dirty="0"/>
           </a:p>
@@ -2095,7 +2103,7 @@
           <a:p>
             <a:fld id="{0536FF60-20DE-42A1-AD3F-836407FBD114}" type="datetimeFigureOut">
               <a:rPr lang="en-US" smtClean="0"/>
-              <a:t>4/4/2018</a:t>
+              <a:t>4/5/2018</a:t>
             </a:fld>
             <a:endParaRPr lang="en-US" dirty="0"/>
           </a:p>
@@ -2348,7 +2356,7 @@
           <a:p>
             <a:fld id="{0536FF60-20DE-42A1-AD3F-836407FBD114}" type="datetimeFigureOut">
               <a:rPr lang="en-US" smtClean="0"/>
-              <a:t>4/4/2018</a:t>
+              <a:t>4/5/2018</a:t>
             </a:fld>
             <a:endParaRPr lang="en-US" dirty="0"/>
           </a:p>
@@ -2561,7 +2569,7 @@
           <a:p>
             <a:fld id="{0536FF60-20DE-42A1-AD3F-836407FBD114}" type="datetimeFigureOut">
               <a:rPr lang="en-US" smtClean="0"/>
-              <a:t>4/4/2018</a:t>
+              <a:t>4/5/2018</a:t>
             </a:fld>
             <a:endParaRPr lang="en-US" dirty="0"/>
           </a:p>
@@ -3210,6 +3218,39 @@
           <a:bodyPr/>
           <a:lstStyle/>
           <a:p>
+            <a:r>
+              <a:rPr lang="en-US" dirty="0" smtClean="0">
+                <a:latin typeface="+mj-lt"/>
+              </a:rPr>
+              <a:t> </a:t>
+            </a:r>
+            <a:r>
+              <a:rPr lang="en-US" dirty="0">
+                <a:latin typeface="+mj-lt"/>
+              </a:rPr>
+              <a:t>Reading and Writing Using </a:t>
+            </a:r>
+            <a:r>
+              <a:rPr lang="en-US" b="1" i="1" dirty="0" err="1">
+                <a:latin typeface="+mj-lt"/>
+              </a:rPr>
+              <a:t>ObjectMapper</a:t>
+            </a:r>
+            <a:endParaRPr lang="en-US" b="1" dirty="0">
+              <a:latin typeface="+mj-lt"/>
+            </a:endParaRPr>
+          </a:p>
+          <a:p>
+            <a:pPr marL="0" indent="0">
+              <a:buNone/>
+            </a:pPr>
+            <a:r>
+              <a:rPr lang="en-US" dirty="0"/>
+              <a:t/>
+            </a:r>
+            <a:br>
+              <a:rPr lang="en-US" dirty="0"/>
+            </a:br>
             <a:endParaRPr lang="en-US" dirty="0"/>
           </a:p>
         </p:txBody>
@@ -3224,6 +3265,468 @@
   <p:clrMapOvr>
     <a:masterClrMapping/>
   </p:clrMapOvr>
+  <p:timing>
+    <p:tnLst>
+      <p:par>
+        <p:cTn id="1" dur="indefinite" restart="never" nodeType="tmRoot"/>
+      </p:par>
+    </p:tnLst>
+  </p:timing>
+</p:sld>
+</file>
+
+<file path=ppt/slides/slide4.xml><?xml version="1.0" encoding="utf-8"?>
+<p:sld xmlns:a="http://schemas.openxmlformats.org/drawingml/2006/main" xmlns:r="http://schemas.openxmlformats.org/officeDocument/2006/relationships" xmlns:p="http://schemas.openxmlformats.org/presentationml/2006/main">
+  <p:cSld>
+    <p:spTree>
+      <p:nvGrpSpPr>
+        <p:cNvPr id="1" name=""/>
+        <p:cNvGrpSpPr/>
+        <p:nvPr/>
+      </p:nvGrpSpPr>
+      <p:grpSpPr>
+        <a:xfrm>
+          <a:off x="0" y="0"/>
+          <a:ext cx="0" cy="0"/>
+          <a:chOff x="0" y="0"/>
+          <a:chExt cx="0" cy="0"/>
+        </a:xfrm>
+      </p:grpSpPr>
+      <p:sp>
+        <p:nvSpPr>
+          <p:cNvPr id="2" name="Title 1"/>
+          <p:cNvSpPr>
+            <a:spLocks noGrp="1"/>
+          </p:cNvSpPr>
+          <p:nvPr>
+            <p:ph type="title"/>
+          </p:nvPr>
+        </p:nvSpPr>
+        <p:spPr>
+          <a:xfrm>
+            <a:off x="838200" y="365125"/>
+            <a:ext cx="10515600" cy="783451"/>
+          </a:xfrm>
+        </p:spPr>
+        <p:txBody>
+          <a:bodyPr>
+            <a:normAutofit/>
+          </a:bodyPr>
+          <a:lstStyle/>
+          <a:p>
+            <a:r>
+              <a:rPr lang="en-US" dirty="0" smtClean="0"/>
+              <a:t>JSON-B</a:t>
+            </a:r>
+            <a:endParaRPr lang="en-US" dirty="0"/>
+          </a:p>
+        </p:txBody>
+      </p:sp>
+      <p:sp>
+        <p:nvSpPr>
+          <p:cNvPr id="3" name="Content Placeholder 2"/>
+          <p:cNvSpPr>
+            <a:spLocks noGrp="1"/>
+          </p:cNvSpPr>
+          <p:nvPr>
+            <p:ph idx="1"/>
+          </p:nvPr>
+        </p:nvSpPr>
+        <p:spPr>
+          <a:xfrm>
+            <a:off x="838200" y="1572322"/>
+            <a:ext cx="10515600" cy="4604641"/>
+          </a:xfrm>
+        </p:spPr>
+        <p:txBody>
+          <a:bodyPr/>
+          <a:lstStyle/>
+          <a:p>
+            <a:pPr marL="0" indent="0">
+              <a:buNone/>
+            </a:pPr>
+            <a:endParaRPr lang="en-US" sz="3600" dirty="0" smtClean="0"/>
+          </a:p>
+          <a:p>
+            <a:r>
+              <a:rPr lang="en-US" sz="3600" b="1" dirty="0" err="1" smtClean="0"/>
+              <a:t>Jsonb</a:t>
+            </a:r>
+            <a:r>
+              <a:rPr lang="en-US" sz="3600" dirty="0" smtClean="0"/>
+              <a:t> - enables serialization and deserialization via the methods </a:t>
+            </a:r>
+            <a:r>
+              <a:rPr lang="en-US" sz="3600" b="1" dirty="0" err="1" smtClean="0"/>
+              <a:t>toJson</a:t>
+            </a:r>
+            <a:r>
+              <a:rPr lang="en-US" sz="3600" dirty="0" smtClean="0"/>
+              <a:t>() and </a:t>
+            </a:r>
+            <a:r>
+              <a:rPr lang="en-US" sz="3600" b="1" dirty="0" err="1" smtClean="0"/>
+              <a:t>fromJson</a:t>
+            </a:r>
+            <a:r>
+              <a:rPr lang="en-US" sz="3600" dirty="0" smtClean="0"/>
+              <a:t>()</a:t>
+            </a:r>
+          </a:p>
+          <a:p>
+            <a:pPr marL="0" indent="0">
+              <a:buNone/>
+            </a:pPr>
+            <a:endParaRPr lang="en-US" sz="3600" dirty="0"/>
+          </a:p>
+          <a:p>
+            <a:r>
+              <a:rPr lang="en-US" sz="3600" b="1" dirty="0" err="1" smtClean="0"/>
+              <a:t>JsonBuilder</a:t>
+            </a:r>
+            <a:r>
+              <a:rPr lang="en-US" sz="3600" dirty="0" smtClean="0"/>
+              <a:t> – constructs </a:t>
+            </a:r>
+            <a:r>
+              <a:rPr lang="en-US" sz="3600" i="1" dirty="0" err="1" smtClean="0"/>
+              <a:t>Jsonb</a:t>
+            </a:r>
+            <a:r>
+              <a:rPr lang="en-US" sz="3600" dirty="0" smtClean="0"/>
+              <a:t> </a:t>
+            </a:r>
+            <a:r>
+              <a:rPr lang="en-US" sz="3600" dirty="0" err="1" smtClean="0"/>
+              <a:t>isntances</a:t>
+            </a:r>
+            <a:r>
+              <a:rPr lang="en-US" sz="3600" dirty="0" smtClean="0"/>
+              <a:t> on a set of optional configurations and </a:t>
+            </a:r>
+            <a:r>
+              <a:rPr lang="en-US" sz="3600" dirty="0" err="1" smtClean="0"/>
+              <a:t>rovides</a:t>
+            </a:r>
+            <a:r>
+              <a:rPr lang="en-US" sz="3600" dirty="0" smtClean="0"/>
+              <a:t> client access to the instance.</a:t>
+            </a:r>
+            <a:endParaRPr lang="en-US" sz="3600" dirty="0"/>
+          </a:p>
+          <a:p>
+            <a:endParaRPr lang="en-US" dirty="0"/>
+          </a:p>
+        </p:txBody>
+      </p:sp>
+    </p:spTree>
+    <p:extLst>
+      <p:ext uri="{BB962C8B-B14F-4D97-AF65-F5344CB8AC3E}">
+        <p14:creationId xmlns:p14="http://schemas.microsoft.com/office/powerpoint/2010/main" val="2340407854"/>
+      </p:ext>
+    </p:extLst>
+  </p:cSld>
+  <p:clrMapOvr>
+    <a:masterClrMapping/>
+  </p:clrMapOvr>
+  <p:timing>
+    <p:tnLst>
+      <p:par>
+        <p:cTn id="1" dur="indefinite" restart="never" nodeType="tmRoot"/>
+      </p:par>
+    </p:tnLst>
+  </p:timing>
+</p:sld>
+</file>
+
+<file path=ppt/slides/slide5.xml><?xml version="1.0" encoding="utf-8"?>
+<p:sld xmlns:a="http://schemas.openxmlformats.org/drawingml/2006/main" xmlns:r="http://schemas.openxmlformats.org/officeDocument/2006/relationships" xmlns:p="http://schemas.openxmlformats.org/presentationml/2006/main">
+  <p:cSld>
+    <p:spTree>
+      <p:nvGrpSpPr>
+        <p:cNvPr id="1" name=""/>
+        <p:cNvGrpSpPr/>
+        <p:nvPr/>
+      </p:nvGrpSpPr>
+      <p:grpSpPr>
+        <a:xfrm>
+          <a:off x="0" y="0"/>
+          <a:ext cx="0" cy="0"/>
+          <a:chOff x="0" y="0"/>
+          <a:chExt cx="0" cy="0"/>
+        </a:xfrm>
+      </p:grpSpPr>
+      <p:sp>
+        <p:nvSpPr>
+          <p:cNvPr id="2" name="Title 1"/>
+          <p:cNvSpPr>
+            <a:spLocks noGrp="1"/>
+          </p:cNvSpPr>
+          <p:nvPr>
+            <p:ph type="title"/>
+          </p:nvPr>
+        </p:nvSpPr>
+        <p:spPr>
+          <a:xfrm>
+            <a:off x="838200" y="365126"/>
+            <a:ext cx="10515600" cy="961870"/>
+          </a:xfrm>
+        </p:spPr>
+        <p:txBody>
+          <a:bodyPr/>
+          <a:lstStyle/>
+          <a:p>
+            <a:r>
+              <a:rPr lang="en-US" dirty="0"/>
+              <a:t>JSON-B custom mapping</a:t>
+            </a:r>
+          </a:p>
+        </p:txBody>
+      </p:sp>
+      <p:sp>
+        <p:nvSpPr>
+          <p:cNvPr id="3" name="Content Placeholder 2"/>
+          <p:cNvSpPr>
+            <a:spLocks noGrp="1"/>
+          </p:cNvSpPr>
+          <p:nvPr>
+            <p:ph idx="1"/>
+          </p:nvPr>
+        </p:nvSpPr>
+        <p:spPr/>
+        <p:txBody>
+          <a:bodyPr/>
+          <a:lstStyle/>
+          <a:p>
+            <a:endParaRPr lang="en-US" dirty="0" smtClean="0"/>
+          </a:p>
+          <a:p>
+            <a:r>
+              <a:rPr lang="en-US" dirty="0"/>
+              <a:t> </a:t>
+            </a:r>
+            <a:r>
+              <a:rPr lang="en-US" dirty="0" smtClean="0"/>
+              <a:t>The </a:t>
+            </a:r>
+            <a:r>
+              <a:rPr lang="en-US" dirty="0"/>
+              <a:t>annotation </a:t>
+            </a:r>
+            <a:r>
+              <a:rPr lang="en-US" dirty="0" smtClean="0"/>
+              <a:t>model</a:t>
+            </a:r>
+            <a:r>
+              <a:rPr lang="en-US" dirty="0"/>
+              <a:t> </a:t>
+            </a:r>
+            <a:endParaRPr lang="en-US" dirty="0" smtClean="0"/>
+          </a:p>
+          <a:p>
+            <a:endParaRPr lang="en-US" dirty="0"/>
+          </a:p>
+          <a:p>
+            <a:endParaRPr lang="en-US" dirty="0" smtClean="0"/>
+          </a:p>
+          <a:p>
+            <a:endParaRPr lang="en-US" dirty="0"/>
+          </a:p>
+          <a:p>
+            <a:r>
+              <a:rPr lang="en-US" dirty="0" smtClean="0"/>
+              <a:t>Runtime model – builds an instance of </a:t>
+            </a:r>
+            <a:r>
+              <a:rPr lang="en-US" dirty="0" err="1" smtClean="0"/>
+              <a:t>JsonbConfig</a:t>
+            </a:r>
+            <a:r>
+              <a:rPr lang="en-US" dirty="0" smtClean="0"/>
+              <a:t>, which it passes to the create() method of </a:t>
+            </a:r>
+            <a:r>
+              <a:rPr lang="en-US" dirty="0" err="1" smtClean="0"/>
+              <a:t>JsonBuilder</a:t>
+            </a:r>
+            <a:r>
+              <a:rPr lang="en-US" dirty="0" smtClean="0"/>
+              <a:t> </a:t>
+            </a:r>
+            <a:endParaRPr lang="en-US" dirty="0"/>
+          </a:p>
+        </p:txBody>
+      </p:sp>
+    </p:spTree>
+    <p:extLst>
+      <p:ext uri="{BB962C8B-B14F-4D97-AF65-F5344CB8AC3E}">
+        <p14:creationId xmlns:p14="http://schemas.microsoft.com/office/powerpoint/2010/main" val="2925988559"/>
+      </p:ext>
+    </p:extLst>
+  </p:cSld>
+  <p:clrMapOvr>
+    <a:masterClrMapping/>
+  </p:clrMapOvr>
+  <p:timing>
+    <p:tnLst>
+      <p:par>
+        <p:cTn id="1" dur="indefinite" restart="never" nodeType="tmRoot"/>
+      </p:par>
+    </p:tnLst>
+  </p:timing>
+</p:sld>
+</file>
+
+<file path=ppt/slides/slide6.xml><?xml version="1.0" encoding="utf-8"?>
+<p:sld xmlns:a="http://schemas.openxmlformats.org/drawingml/2006/main" xmlns:r="http://schemas.openxmlformats.org/officeDocument/2006/relationships" xmlns:p="http://schemas.openxmlformats.org/presentationml/2006/main">
+  <p:cSld>
+    <p:spTree>
+      <p:nvGrpSpPr>
+        <p:cNvPr id="1" name=""/>
+        <p:cNvGrpSpPr/>
+        <p:nvPr/>
+      </p:nvGrpSpPr>
+      <p:grpSpPr>
+        <a:xfrm>
+          <a:off x="0" y="0"/>
+          <a:ext cx="0" cy="0"/>
+          <a:chOff x="0" y="0"/>
+          <a:chExt cx="0" cy="0"/>
+        </a:xfrm>
+      </p:grpSpPr>
+      <p:sp>
+        <p:nvSpPr>
+          <p:cNvPr id="2" name="Title 1"/>
+          <p:cNvSpPr>
+            <a:spLocks noGrp="1"/>
+          </p:cNvSpPr>
+          <p:nvPr>
+            <p:ph type="title"/>
+          </p:nvPr>
+        </p:nvSpPr>
+        <p:spPr>
+          <a:xfrm>
+            <a:off x="838200" y="365126"/>
+            <a:ext cx="10515600" cy="995324"/>
+          </a:xfrm>
+        </p:spPr>
+        <p:txBody>
+          <a:bodyPr>
+            <a:normAutofit/>
+          </a:bodyPr>
+          <a:lstStyle/>
+          <a:p>
+            <a:r>
+              <a:rPr lang="en-US" dirty="0" smtClean="0"/>
+              <a:t>Advanced customization </a:t>
+            </a:r>
+            <a:endParaRPr lang="en-US" dirty="0"/>
+          </a:p>
+        </p:txBody>
+      </p:sp>
+      <p:sp>
+        <p:nvSpPr>
+          <p:cNvPr id="3" name="Content Placeholder 2"/>
+          <p:cNvSpPr>
+            <a:spLocks noGrp="1"/>
+          </p:cNvSpPr>
+          <p:nvPr>
+            <p:ph idx="1"/>
+          </p:nvPr>
+        </p:nvSpPr>
+        <p:spPr>
+          <a:xfrm>
+            <a:off x="838200" y="1605775"/>
+            <a:ext cx="10515600" cy="4571187"/>
+          </a:xfrm>
+        </p:spPr>
+        <p:txBody>
+          <a:bodyPr>
+            <a:normAutofit/>
+          </a:bodyPr>
+          <a:lstStyle/>
+          <a:p>
+            <a:pPr marL="0" indent="0">
+              <a:buNone/>
+            </a:pPr>
+            <a:r>
+              <a:rPr lang="en-US" dirty="0" smtClean="0"/>
+              <a:t>    In </a:t>
+            </a:r>
+            <a:r>
+              <a:rPr lang="en-US" dirty="0"/>
+              <a:t>some circumstances neither annotations nor runtime configuration will help. For example, it’s often impossible to annotate third-party classes. Classes that don't have a default constructor are also troublesome.</a:t>
+            </a:r>
+            <a:endParaRPr lang="en-US" dirty="0" smtClean="0"/>
+          </a:p>
+          <a:p>
+            <a:pPr marL="0" indent="0">
+              <a:buNone/>
+            </a:pPr>
+            <a:endParaRPr lang="en-US" dirty="0"/>
+          </a:p>
+          <a:p>
+            <a:pPr marL="0" indent="0">
+              <a:buNone/>
+            </a:pPr>
+            <a:endParaRPr lang="en-US" dirty="0"/>
+          </a:p>
+          <a:p>
+            <a:r>
+              <a:rPr lang="en-US" dirty="0" smtClean="0"/>
+              <a:t>JSON-B with </a:t>
+            </a:r>
+            <a:r>
+              <a:rPr lang="en-US" b="1" dirty="0" smtClean="0"/>
+              <a:t>adapters</a:t>
+            </a:r>
+          </a:p>
+          <a:p>
+            <a:r>
+              <a:rPr lang="en-US" dirty="0" smtClean="0"/>
+              <a:t>JSON-B with </a:t>
+            </a:r>
+            <a:r>
+              <a:rPr lang="en-US" b="1" dirty="0" err="1" smtClean="0"/>
+              <a:t>serializers</a:t>
+            </a:r>
+            <a:r>
+              <a:rPr lang="en-US" dirty="0" smtClean="0"/>
+              <a:t> and </a:t>
+            </a:r>
+            <a:r>
+              <a:rPr lang="en-US" dirty="0" err="1" smtClean="0"/>
+              <a:t>deserializers</a:t>
+            </a:r>
+            <a:r>
+              <a:rPr lang="en-US" dirty="0" smtClean="0"/>
+              <a:t> -</a:t>
+            </a:r>
+            <a:r>
+              <a:rPr lang="en-US" dirty="0"/>
+              <a:t>are the lowest level of customization available, giving you access to the parsers and generators found in the JSON Processing API.</a:t>
+            </a:r>
+            <a:endParaRPr lang="en-US" dirty="0"/>
+          </a:p>
+        </p:txBody>
+      </p:sp>
+    </p:spTree>
+    <p:extLst>
+      <p:ext uri="{BB962C8B-B14F-4D97-AF65-F5344CB8AC3E}">
+        <p14:creationId xmlns:p14="http://schemas.microsoft.com/office/powerpoint/2010/main" val="3340036028"/>
+      </p:ext>
+    </p:extLst>
+  </p:cSld>
+  <p:clrMapOvr>
+    <a:masterClrMapping/>
+  </p:clrMapOvr>
+  <p:timing>
+    <p:tnLst>
+      <p:par>
+        <p:cTn id="1" dur="indefinite" restart="never" nodeType="tmRoot"/>
+      </p:par>
+    </p:tnLst>
+  </p:timing>
 </p:sld>
 </file>
 

</xml_diff>